<commit_message>
added train/test accepts data sets
</commit_message>
<xml_diff>
--- a/d_of_e/slides/powerpoints/DOE Lecture 3.pptx
+++ b/d_of_e/slides/powerpoints/DOE Lecture 3.pptx
@@ -324,7 +324,7 @@
           <a:p>
             <a:fld id="{DDE8FAAE-0929-4DCA-A2F5-877264919C14}" type="datetimeFigureOut">
               <a:rPr lang="en-US" smtClean="0"/>
-              <a:t>12/24/2018</a:t>
+              <a:t>1/14/2019</a:t>
             </a:fld>
             <a:endParaRPr lang="en-US"/>
           </a:p>
@@ -494,7 +494,7 @@
           <a:p>
             <a:fld id="{DDE8FAAE-0929-4DCA-A2F5-877264919C14}" type="datetimeFigureOut">
               <a:rPr lang="en-US" smtClean="0"/>
-              <a:t>12/24/2018</a:t>
+              <a:t>1/14/2019</a:t>
             </a:fld>
             <a:endParaRPr lang="en-US"/>
           </a:p>
@@ -674,7 +674,7 @@
           <a:p>
             <a:fld id="{DDE8FAAE-0929-4DCA-A2F5-877264919C14}" type="datetimeFigureOut">
               <a:rPr lang="en-US" smtClean="0"/>
-              <a:t>12/24/2018</a:t>
+              <a:t>1/14/2019</a:t>
             </a:fld>
             <a:endParaRPr lang="en-US"/>
           </a:p>
@@ -844,7 +844,7 @@
           <a:p>
             <a:fld id="{DDE8FAAE-0929-4DCA-A2F5-877264919C14}" type="datetimeFigureOut">
               <a:rPr lang="en-US" smtClean="0"/>
-              <a:t>12/24/2018</a:t>
+              <a:t>1/14/2019</a:t>
             </a:fld>
             <a:endParaRPr lang="en-US"/>
           </a:p>
@@ -1090,7 +1090,7 @@
           <a:p>
             <a:fld id="{DDE8FAAE-0929-4DCA-A2F5-877264919C14}" type="datetimeFigureOut">
               <a:rPr lang="en-US" smtClean="0"/>
-              <a:t>12/24/2018</a:t>
+              <a:t>1/14/2019</a:t>
             </a:fld>
             <a:endParaRPr lang="en-US"/>
           </a:p>
@@ -1322,7 +1322,7 @@
           <a:p>
             <a:fld id="{DDE8FAAE-0929-4DCA-A2F5-877264919C14}" type="datetimeFigureOut">
               <a:rPr lang="en-US" smtClean="0"/>
-              <a:t>12/24/2018</a:t>
+              <a:t>1/14/2019</a:t>
             </a:fld>
             <a:endParaRPr lang="en-US"/>
           </a:p>
@@ -1689,7 +1689,7 @@
           <a:p>
             <a:fld id="{DDE8FAAE-0929-4DCA-A2F5-877264919C14}" type="datetimeFigureOut">
               <a:rPr lang="en-US" smtClean="0"/>
-              <a:t>12/24/2018</a:t>
+              <a:t>1/14/2019</a:t>
             </a:fld>
             <a:endParaRPr lang="en-US"/>
           </a:p>
@@ -1807,7 +1807,7 @@
           <a:p>
             <a:fld id="{DDE8FAAE-0929-4DCA-A2F5-877264919C14}" type="datetimeFigureOut">
               <a:rPr lang="en-US" smtClean="0"/>
-              <a:t>12/24/2018</a:t>
+              <a:t>1/14/2019</a:t>
             </a:fld>
             <a:endParaRPr lang="en-US"/>
           </a:p>
@@ -1902,7 +1902,7 @@
           <a:p>
             <a:fld id="{DDE8FAAE-0929-4DCA-A2F5-877264919C14}" type="datetimeFigureOut">
               <a:rPr lang="en-US" smtClean="0"/>
-              <a:t>12/24/2018</a:t>
+              <a:t>1/14/2019</a:t>
             </a:fld>
             <a:endParaRPr lang="en-US"/>
           </a:p>
@@ -2179,7 +2179,7 @@
           <a:p>
             <a:fld id="{DDE8FAAE-0929-4DCA-A2F5-877264919C14}" type="datetimeFigureOut">
               <a:rPr lang="en-US" smtClean="0"/>
-              <a:t>12/24/2018</a:t>
+              <a:t>1/14/2019</a:t>
             </a:fld>
             <a:endParaRPr lang="en-US"/>
           </a:p>
@@ -2432,7 +2432,7 @@
           <a:p>
             <a:fld id="{DDE8FAAE-0929-4DCA-A2F5-877264919C14}" type="datetimeFigureOut">
               <a:rPr lang="en-US" smtClean="0"/>
-              <a:t>12/24/2018</a:t>
+              <a:t>1/14/2019</a:t>
             </a:fld>
             <a:endParaRPr lang="en-US"/>
           </a:p>
@@ -2645,7 +2645,7 @@
           <a:p>
             <a:fld id="{DDE8FAAE-0929-4DCA-A2F5-877264919C14}" type="datetimeFigureOut">
               <a:rPr lang="en-US" smtClean="0"/>
-              <a:t>12/24/2018</a:t>
+              <a:t>1/14/2019</a:t>
             </a:fld>
             <a:endParaRPr lang="en-US"/>
           </a:p>
@@ -13540,11 +13540,7 @@
             </a:r>
             <a:r>
               <a:rPr lang="en-US" dirty="0" smtClean="0"/>
-              <a:t> </a:t>
-            </a:r>
-            <a:r>
-              <a:rPr lang="en-US" dirty="0" smtClean="0"/>
-              <a:t>adjustment, but technically I have 7 comparisons.  Six original, plus the other one, so to control for the type I error my </a:t>
+              <a:t> adjustment, but technically I have 7 comparisons.  Six original, plus the other one, so to control for the type I error my </a:t>
             </a:r>
             <a:r>
               <a:rPr lang="el-GR" dirty="0" smtClean="0"/>
@@ -13552,11 +13548,7 @@
             </a:r>
             <a:r>
               <a:rPr lang="en-US" dirty="0" smtClean="0"/>
-              <a:t>* = 0.05/7 = </a:t>
-            </a:r>
-            <a:r>
-              <a:rPr lang="en-US" dirty="0" smtClean="0"/>
-              <a:t>0.007.  </a:t>
+              <a:t>* = 0.05/7 = 0.007.  </a:t>
             </a:r>
             <a:endParaRPr lang="en-US" dirty="0"/>
           </a:p>
@@ -15487,21 +15479,8 @@
             </a:pPr>
             <a:r>
               <a:rPr lang="en-US" dirty="0" smtClean="0"/>
-              <a:t>Last time there were </a:t>
-            </a:r>
-            <a:r>
-              <a:rPr lang="en-US" dirty="0" smtClean="0"/>
-              <a:t>two </a:t>
-            </a:r>
-            <a:r>
-              <a:rPr lang="en-US" dirty="0" smtClean="0"/>
-              <a:t>things that we needed to go over more. </a:t>
-            </a:r>
-            <a:r>
-              <a:rPr lang="en-US" dirty="0" smtClean="0"/>
-              <a:t> The big one is : </a:t>
-            </a:r>
-            <a:endParaRPr lang="en-US" dirty="0" smtClean="0"/>
+              <a:t>Last time there were two things that we needed to go over more.  The big one is : </a:t>
+            </a:r>
           </a:p>
           <a:p>
             <a:pPr marL="0" indent="0">
@@ -15515,11 +15494,7 @@
             </a:pPr>
             <a:r>
               <a:rPr lang="en-US" b="1" dirty="0" smtClean="0"/>
-              <a:t>Additional </a:t>
-            </a:r>
-            <a:r>
-              <a:rPr lang="en-US" b="1" dirty="0" smtClean="0"/>
-              <a:t>Covariates</a:t>
+              <a:t>Additional Covariates</a:t>
             </a:r>
           </a:p>
           <a:p>
@@ -15543,13 +15518,8 @@
             </a:pPr>
             <a:r>
               <a:rPr lang="en-US" dirty="0" smtClean="0"/>
-              <a:t>If you are randomizing out extra variability, does it matter? </a:t>
-            </a:r>
-            <a:r>
-              <a:rPr lang="en-US" dirty="0" smtClean="0"/>
-              <a:t> </a:t>
-            </a:r>
-            <a:endParaRPr lang="en-US" dirty="0" smtClean="0"/>
+              <a:t>If you are randomizing out extra variability, does it matter?  </a:t>
+            </a:r>
           </a:p>
         </p:txBody>
       </p:sp>
@@ -20219,9 +20189,99 @@
         </p:nvSpPr>
         <p:spPr/>
         <p:txBody>
-          <a:bodyPr/>
+          <a:bodyPr>
+            <a:normAutofit fontScale="92500" lnSpcReduction="20000"/>
+          </a:bodyPr>
           <a:lstStyle/>
           <a:p>
+            <a:pPr marL="0" indent="0">
+              <a:buNone/>
+            </a:pPr>
+            <a:r>
+              <a:rPr lang="en-US" dirty="0" smtClean="0"/>
+              <a:t>Type I and Type III sums of squares are based upon how the model computes ‘variance’ with or without the other components. </a:t>
+            </a:r>
+          </a:p>
+          <a:p>
+            <a:pPr marL="0" indent="0">
+              <a:buNone/>
+            </a:pPr>
+            <a:endParaRPr lang="en-US" dirty="0"/>
+          </a:p>
+          <a:p>
+            <a:pPr marL="0" indent="0">
+              <a:buNone/>
+            </a:pPr>
+            <a:r>
+              <a:rPr lang="en-US" dirty="0" smtClean="0">
+                <a:solidFill>
+                  <a:schemeClr val="accent1">
+                    <a:lumMod val="75000"/>
+                  </a:schemeClr>
+                </a:solidFill>
+              </a:rPr>
+              <a:t>Type I </a:t>
+            </a:r>
+            <a:r>
+              <a:rPr lang="en-US" dirty="0" smtClean="0"/>
+              <a:t>is typically called sequential sums of squares.  It computes the SS first with factor A without factor/block B in the model and then with factor B with factor A in the model.</a:t>
+            </a:r>
+          </a:p>
+          <a:p>
+            <a:pPr marL="0" indent="0">
+              <a:buNone/>
+            </a:pPr>
+            <a:r>
+              <a:rPr lang="en-US" dirty="0" smtClean="0"/>
+              <a:t>SS(A) and then SS(B|A) </a:t>
+            </a:r>
+          </a:p>
+          <a:p>
+            <a:pPr marL="0" indent="0">
+              <a:buNone/>
+            </a:pPr>
+            <a:endParaRPr lang="en-US" dirty="0"/>
+          </a:p>
+          <a:p>
+            <a:pPr marL="0" indent="0">
+              <a:buNone/>
+            </a:pPr>
+            <a:r>
+              <a:rPr lang="en-US" dirty="0" smtClean="0">
+                <a:solidFill>
+                  <a:schemeClr val="accent1">
+                    <a:lumMod val="75000"/>
+                  </a:schemeClr>
+                </a:solidFill>
+              </a:rPr>
+              <a:t>Type III </a:t>
+            </a:r>
+            <a:r>
+              <a:rPr lang="en-US" dirty="0" smtClean="0"/>
+              <a:t>is the marginal sums of squares. This version gives the SS if it would be the LAST VARIABLE entered into the model. </a:t>
+            </a:r>
+            <a:endParaRPr lang="en-US" dirty="0"/>
+          </a:p>
+          <a:p>
+            <a:pPr marL="0" indent="0">
+              <a:buNone/>
+            </a:pPr>
+            <a:endParaRPr lang="en-US" dirty="0" smtClean="0">
+              <a:solidFill>
+                <a:schemeClr val="accent1">
+                  <a:lumMod val="75000"/>
+                </a:schemeClr>
+              </a:solidFill>
+            </a:endParaRPr>
+          </a:p>
+          <a:p>
+            <a:pPr marL="0" indent="0">
+              <a:buNone/>
+            </a:pPr>
+            <a:r>
+              <a:rPr lang="en-US" dirty="0" smtClean="0"/>
+              <a:t>SS(A|B) and SS(B|A)</a:t>
+            </a:r>
             <a:endParaRPr lang="en-US" dirty="0"/>
           </a:p>
         </p:txBody>
@@ -21893,7 +21953,15 @@
             </a:r>
             <a:r>
               <a:rPr lang="en-US" dirty="0" smtClean="0"/>
-              <a:t>: These are things we can include in our experimental design.  That is we assign experimental units to Blocks.  </a:t>
+              <a:t>: These are things we can include in our experimental design.  That is we assign </a:t>
+            </a:r>
+            <a:r>
+              <a:rPr lang="en-US" dirty="0"/>
+              <a:t>f</a:t>
+            </a:r>
+            <a:r>
+              <a:rPr lang="en-US" dirty="0" smtClean="0"/>
+              <a:t>actors to Blocks.  </a:t>
             </a:r>
           </a:p>
           <a:p>
@@ -22015,7 +22083,7 @@
             </a:pPr>
             <a:r>
               <a:rPr lang="en-US" dirty="0" smtClean="0"/>
-              <a:t>Blocks are thing we can assign experimental units, this effects how we design our experiment. </a:t>
+              <a:t>Blocks are thing we can assign factors to, this effects how we design our experiment. By placing  treatments in this ‘block’ I can learn about how this block affects variability, but more importantly get better estimates </a:t>
             </a:r>
           </a:p>
           <a:p>
@@ -25037,15 +25105,7 @@
             </a:pPr>
             <a:r>
               <a:rPr lang="en-US" dirty="0" smtClean="0"/>
-              <a:t>To save </a:t>
-            </a:r>
-            <a:r>
-              <a:rPr lang="en-US" dirty="0" smtClean="0"/>
-              <a:t>energy</a:t>
-            </a:r>
-            <a:r>
-              <a:rPr lang="en-US" dirty="0" smtClean="0"/>
-              <a:t>, an engineer investigated the effects of different types of insulation for the same home design. We are interested in looking into differences in cooling costs for the months of June, July and August. </a:t>
+              <a:t>To save energy, an engineer investigated the effects of different types of insulation for the same home design. We are interested in looking into differences in cooling costs for the months of June, July and August. </a:t>
             </a:r>
             <a:endParaRPr lang="en-US" dirty="0"/>
           </a:p>
@@ -25637,15 +25697,7 @@
             </a:r>
             <a:r>
               <a:rPr lang="en-US" dirty="0" smtClean="0"/>
-              <a:t>Amount </a:t>
-            </a:r>
-            <a:r>
-              <a:rPr lang="en-US" dirty="0" smtClean="0"/>
-              <a:t>spent </a:t>
-            </a:r>
-            <a:r>
-              <a:rPr lang="en-US" dirty="0" smtClean="0"/>
-              <a:t>on cooling house. </a:t>
+              <a:t>Amount spent on cooling house. </a:t>
             </a:r>
           </a:p>
           <a:p>
@@ -25913,7 +25965,25 @@
                 </a:solidFill>
                 <a:latin typeface="Courier New" panose="02070309020205020404" pitchFamily="49" charset="0"/>
               </a:rPr>
-              <a:t>1 1 74.44 2	1 89.96	3 1	82.00</a:t>
+              <a:t>1 1 74.44 2	1 </a:t>
+            </a:r>
+            <a:r>
+              <a:rPr lang="en-US" dirty="0" smtClean="0">
+                <a:solidFill>
+                  <a:srgbClr val="000000"/>
+                </a:solidFill>
+                <a:latin typeface="Courier New" panose="02070309020205020404" pitchFamily="49" charset="0"/>
+              </a:rPr>
+              <a:t>89.96 3 </a:t>
+            </a:r>
+            <a:r>
+              <a:rPr lang="en-US" dirty="0">
+                <a:solidFill>
+                  <a:srgbClr val="000000"/>
+                </a:solidFill>
+                <a:latin typeface="Courier New" panose="02070309020205020404" pitchFamily="49" charset="0"/>
+              </a:rPr>
+              <a:t>1	82.00</a:t>
             </a:r>
           </a:p>
           <a:p>

</xml_diff>